<commit_message>
correction class en className
</commit_message>
<xml_diff>
--- a/ERC20.pptx
+++ b/ERC20.pptx
@@ -9,6 +9,7 @@
     <p:sldId id="260" r:id="rId3"/>
     <p:sldId id="261" r:id="rId4"/>
     <p:sldId id="262" r:id="rId5"/>
+    <p:sldId id="263" r:id="rId6"/>
   </p:sldIdLst>
   <p:sldSz cx="12192000" cy="6858000"/>
   <p:notesSz cx="6858000" cy="9144000"/>
@@ -246,7 +247,7 @@
           <a:p>
             <a:fld id="{7235E7F2-F81C-4522-B89D-2B5DA764A5CB}" type="datetimeFigureOut">
               <a:rPr lang="fr-FR" smtClean="0"/>
-              <a:t>09/04/2020</a:t>
+              <a:t>11/04/2020</a:t>
             </a:fld>
             <a:endParaRPr lang="fr-FR"/>
           </a:p>
@@ -416,7 +417,7 @@
           <a:p>
             <a:fld id="{7235E7F2-F81C-4522-B89D-2B5DA764A5CB}" type="datetimeFigureOut">
               <a:rPr lang="fr-FR" smtClean="0"/>
-              <a:t>09/04/2020</a:t>
+              <a:t>11/04/2020</a:t>
             </a:fld>
             <a:endParaRPr lang="fr-FR"/>
           </a:p>
@@ -596,7 +597,7 @@
           <a:p>
             <a:fld id="{7235E7F2-F81C-4522-B89D-2B5DA764A5CB}" type="datetimeFigureOut">
               <a:rPr lang="fr-FR" smtClean="0"/>
-              <a:t>09/04/2020</a:t>
+              <a:t>11/04/2020</a:t>
             </a:fld>
             <a:endParaRPr lang="fr-FR"/>
           </a:p>
@@ -766,7 +767,7 @@
           <a:p>
             <a:fld id="{7235E7F2-F81C-4522-B89D-2B5DA764A5CB}" type="datetimeFigureOut">
               <a:rPr lang="fr-FR" smtClean="0"/>
-              <a:t>09/04/2020</a:t>
+              <a:t>11/04/2020</a:t>
             </a:fld>
             <a:endParaRPr lang="fr-FR"/>
           </a:p>
@@ -1012,7 +1013,7 @@
           <a:p>
             <a:fld id="{7235E7F2-F81C-4522-B89D-2B5DA764A5CB}" type="datetimeFigureOut">
               <a:rPr lang="fr-FR" smtClean="0"/>
-              <a:t>09/04/2020</a:t>
+              <a:t>11/04/2020</a:t>
             </a:fld>
             <a:endParaRPr lang="fr-FR"/>
           </a:p>
@@ -1244,7 +1245,7 @@
           <a:p>
             <a:fld id="{7235E7F2-F81C-4522-B89D-2B5DA764A5CB}" type="datetimeFigureOut">
               <a:rPr lang="fr-FR" smtClean="0"/>
-              <a:t>09/04/2020</a:t>
+              <a:t>11/04/2020</a:t>
             </a:fld>
             <a:endParaRPr lang="fr-FR"/>
           </a:p>
@@ -1611,7 +1612,7 @@
           <a:p>
             <a:fld id="{7235E7F2-F81C-4522-B89D-2B5DA764A5CB}" type="datetimeFigureOut">
               <a:rPr lang="fr-FR" smtClean="0"/>
-              <a:t>09/04/2020</a:t>
+              <a:t>11/04/2020</a:t>
             </a:fld>
             <a:endParaRPr lang="fr-FR"/>
           </a:p>
@@ -1729,7 +1730,7 @@
           <a:p>
             <a:fld id="{7235E7F2-F81C-4522-B89D-2B5DA764A5CB}" type="datetimeFigureOut">
               <a:rPr lang="fr-FR" smtClean="0"/>
-              <a:t>09/04/2020</a:t>
+              <a:t>11/04/2020</a:t>
             </a:fld>
             <a:endParaRPr lang="fr-FR"/>
           </a:p>
@@ -1824,7 +1825,7 @@
           <a:p>
             <a:fld id="{7235E7F2-F81C-4522-B89D-2B5DA764A5CB}" type="datetimeFigureOut">
               <a:rPr lang="fr-FR" smtClean="0"/>
-              <a:t>09/04/2020</a:t>
+              <a:t>11/04/2020</a:t>
             </a:fld>
             <a:endParaRPr lang="fr-FR"/>
           </a:p>
@@ -2101,7 +2102,7 @@
           <a:p>
             <a:fld id="{7235E7F2-F81C-4522-B89D-2B5DA764A5CB}" type="datetimeFigureOut">
               <a:rPr lang="fr-FR" smtClean="0"/>
-              <a:t>09/04/2020</a:t>
+              <a:t>11/04/2020</a:t>
             </a:fld>
             <a:endParaRPr lang="fr-FR"/>
           </a:p>
@@ -2354,7 +2355,7 @@
           <a:p>
             <a:fld id="{7235E7F2-F81C-4522-B89D-2B5DA764A5CB}" type="datetimeFigureOut">
               <a:rPr lang="fr-FR" smtClean="0"/>
-              <a:t>09/04/2020</a:t>
+              <a:t>11/04/2020</a:t>
             </a:fld>
             <a:endParaRPr lang="fr-FR"/>
           </a:p>
@@ -2567,7 +2568,7 @@
           <a:p>
             <a:fld id="{7235E7F2-F81C-4522-B89D-2B5DA764A5CB}" type="datetimeFigureOut">
               <a:rPr lang="fr-FR" smtClean="0"/>
-              <a:t>09/04/2020</a:t>
+              <a:t>11/04/2020</a:t>
             </a:fld>
             <a:endParaRPr lang="fr-FR"/>
           </a:p>
@@ -3761,6 +3762,103 @@
 </p:sld>
 </file>
 
+<file path=ppt/slides/slide5.xml><?xml version="1.0" encoding="utf-8"?>
+<p:sld xmlns:a="http://schemas.openxmlformats.org/drawingml/2006/main" xmlns:r="http://schemas.openxmlformats.org/officeDocument/2006/relationships" xmlns:p="http://schemas.openxmlformats.org/presentationml/2006/main">
+  <p:cSld>
+    <p:spTree>
+      <p:nvGrpSpPr>
+        <p:cNvPr id="1" name=""/>
+        <p:cNvGrpSpPr/>
+        <p:nvPr/>
+      </p:nvGrpSpPr>
+      <p:grpSpPr>
+        <a:xfrm>
+          <a:off x="0" y="0"/>
+          <a:ext cx="0" cy="0"/>
+          <a:chOff x="0" y="0"/>
+          <a:chExt cx="0" cy="0"/>
+        </a:xfrm>
+      </p:grpSpPr>
+      <p:pic>
+        <p:nvPicPr>
+          <p:cNvPr id="2" name="Picture 1"/>
+          <p:cNvPicPr>
+            <a:picLocks noChangeAspect="1"/>
+          </p:cNvPicPr>
+          <p:nvPr/>
+        </p:nvPicPr>
+        <p:blipFill>
+          <a:blip r:embed="rId2">
+            <a:extLst>
+              <a:ext uri="{28A0092B-C50C-407E-A947-70E740481C1C}">
+                <a14:useLocalDpi xmlns:a14="http://schemas.microsoft.com/office/drawing/2010/main" val="0"/>
+              </a:ext>
+            </a:extLst>
+          </a:blip>
+          <a:stretch>
+            <a:fillRect/>
+          </a:stretch>
+        </p:blipFill>
+        <p:spPr>
+          <a:xfrm>
+            <a:off x="0" y="985268"/>
+            <a:ext cx="12192000" cy="5637271"/>
+          </a:xfrm>
+          <a:prstGeom prst="rect">
+            <a:avLst/>
+          </a:prstGeom>
+        </p:spPr>
+      </p:pic>
+      <p:sp>
+        <p:nvSpPr>
+          <p:cNvPr id="3" name="TextBox 2"/>
+          <p:cNvSpPr txBox="1"/>
+          <p:nvPr/>
+        </p:nvSpPr>
+        <p:spPr>
+          <a:xfrm>
+            <a:off x="4828032" y="237744"/>
+            <a:ext cx="3968496" cy="384048"/>
+          </a:xfrm>
+          <a:prstGeom prst="rect">
+            <a:avLst/>
+          </a:prstGeom>
+          <a:noFill/>
+        </p:spPr>
+        <p:txBody>
+          <a:bodyPr wrap="square" rtlCol="0">
+            <a:spAutoFit/>
+          </a:bodyPr>
+          <a:lstStyle/>
+          <a:p>
+            <a:r>
+              <a:rPr lang="fr-FR" dirty="0" smtClean="0"/>
+              <a:t>REACTJS : le cycle de vie</a:t>
+            </a:r>
+            <a:endParaRPr lang="fr-FR" dirty="0"/>
+          </a:p>
+        </p:txBody>
+      </p:sp>
+    </p:spTree>
+    <p:extLst>
+      <p:ext uri="{BB962C8B-B14F-4D97-AF65-F5344CB8AC3E}">
+        <p14:creationId xmlns:p14="http://schemas.microsoft.com/office/powerpoint/2010/main" val="823788113"/>
+      </p:ext>
+    </p:extLst>
+  </p:cSld>
+  <p:clrMapOvr>
+    <a:masterClrMapping/>
+  </p:clrMapOvr>
+  <p:timing>
+    <p:tnLst>
+      <p:par>
+        <p:cTn id="1" dur="indefinite" restart="never" nodeType="tmRoot"/>
+      </p:par>
+    </p:tnLst>
+  </p:timing>
+</p:sld>
+</file>
+
 <file path=ppt/theme/theme1.xml><?xml version="1.0" encoding="utf-8"?>
 <a:theme xmlns:a="http://schemas.openxmlformats.org/drawingml/2006/main" name="Office Theme">
   <a:themeElements>

</xml_diff>